<commit_message>
Minor changes to getting started guide
</commit_message>
<xml_diff>
--- a/docs/admin/OPIL/files/screenshot-material.pptx
+++ b/docs/admin/OPIL/files/screenshot-material.pptx
@@ -262,7 +262,7 @@
           <a:p>
             <a:fld id="{D3269E63-6021-4802-A85A-E59488888885}" type="datetimeFigureOut">
               <a:rPr lang="en-US" smtClean="0"/>
-              <a:t>8/12/2019</a:t>
+              <a:t>9/16/2019</a:t>
             </a:fld>
             <a:endParaRPr lang="en-US"/>
           </a:p>
@@ -460,7 +460,7 @@
           <a:p>
             <a:fld id="{D3269E63-6021-4802-A85A-E59488888885}" type="datetimeFigureOut">
               <a:rPr lang="en-US" smtClean="0"/>
-              <a:t>8/12/2019</a:t>
+              <a:t>9/16/2019</a:t>
             </a:fld>
             <a:endParaRPr lang="en-US"/>
           </a:p>
@@ -668,7 +668,7 @@
           <a:p>
             <a:fld id="{D3269E63-6021-4802-A85A-E59488888885}" type="datetimeFigureOut">
               <a:rPr lang="en-US" smtClean="0"/>
-              <a:t>8/12/2019</a:t>
+              <a:t>9/16/2019</a:t>
             </a:fld>
             <a:endParaRPr lang="en-US"/>
           </a:p>
@@ -866,7 +866,7 @@
           <a:p>
             <a:fld id="{D3269E63-6021-4802-A85A-E59488888885}" type="datetimeFigureOut">
               <a:rPr lang="en-US" smtClean="0"/>
-              <a:t>8/12/2019</a:t>
+              <a:t>9/16/2019</a:t>
             </a:fld>
             <a:endParaRPr lang="en-US"/>
           </a:p>
@@ -1141,7 +1141,7 @@
           <a:p>
             <a:fld id="{D3269E63-6021-4802-A85A-E59488888885}" type="datetimeFigureOut">
               <a:rPr lang="en-US" smtClean="0"/>
-              <a:t>8/12/2019</a:t>
+              <a:t>9/16/2019</a:t>
             </a:fld>
             <a:endParaRPr lang="en-US"/>
           </a:p>
@@ -1406,7 +1406,7 @@
           <a:p>
             <a:fld id="{D3269E63-6021-4802-A85A-E59488888885}" type="datetimeFigureOut">
               <a:rPr lang="en-US" smtClean="0"/>
-              <a:t>8/12/2019</a:t>
+              <a:t>9/16/2019</a:t>
             </a:fld>
             <a:endParaRPr lang="en-US"/>
           </a:p>
@@ -1818,7 +1818,7 @@
           <a:p>
             <a:fld id="{D3269E63-6021-4802-A85A-E59488888885}" type="datetimeFigureOut">
               <a:rPr lang="en-US" smtClean="0"/>
-              <a:t>8/12/2019</a:t>
+              <a:t>9/16/2019</a:t>
             </a:fld>
             <a:endParaRPr lang="en-US"/>
           </a:p>
@@ -1959,7 +1959,7 @@
           <a:p>
             <a:fld id="{D3269E63-6021-4802-A85A-E59488888885}" type="datetimeFigureOut">
               <a:rPr lang="en-US" smtClean="0"/>
-              <a:t>8/12/2019</a:t>
+              <a:t>9/16/2019</a:t>
             </a:fld>
             <a:endParaRPr lang="en-US"/>
           </a:p>
@@ -2072,7 +2072,7 @@
           <a:p>
             <a:fld id="{D3269E63-6021-4802-A85A-E59488888885}" type="datetimeFigureOut">
               <a:rPr lang="en-US" smtClean="0"/>
-              <a:t>8/12/2019</a:t>
+              <a:t>9/16/2019</a:t>
             </a:fld>
             <a:endParaRPr lang="en-US"/>
           </a:p>
@@ -2383,7 +2383,7 @@
           <a:p>
             <a:fld id="{D3269E63-6021-4802-A85A-E59488888885}" type="datetimeFigureOut">
               <a:rPr lang="en-US" smtClean="0"/>
-              <a:t>8/12/2019</a:t>
+              <a:t>9/16/2019</a:t>
             </a:fld>
             <a:endParaRPr lang="en-US"/>
           </a:p>
@@ -2671,7 +2671,7 @@
           <a:p>
             <a:fld id="{D3269E63-6021-4802-A85A-E59488888885}" type="datetimeFigureOut">
               <a:rPr lang="en-US" smtClean="0"/>
-              <a:t>8/12/2019</a:t>
+              <a:t>9/16/2019</a:t>
             </a:fld>
             <a:endParaRPr lang="en-US"/>
           </a:p>
@@ -2912,7 +2912,7 @@
           <a:p>
             <a:fld id="{D3269E63-6021-4802-A85A-E59488888885}" type="datetimeFigureOut">
               <a:rPr lang="en-US" smtClean="0"/>
-              <a:t>8/12/2019</a:t>
+              <a:t>9/16/2019</a:t>
             </a:fld>
             <a:endParaRPr lang="en-US"/>
           </a:p>
@@ -4517,8 +4517,8 @@
         </p:nvSpPr>
         <p:spPr>
           <a:xfrm>
-            <a:off x="6565719" y="3138850"/>
-            <a:ext cx="511486" cy="369332"/>
+            <a:off x="6536501" y="3138850"/>
+            <a:ext cx="540704" cy="369332"/>
           </a:xfrm>
           <a:prstGeom prst="rect">
             <a:avLst/>
@@ -4538,7 +4538,7 @@
                   <a:srgbClr val="00B0F0"/>
                 </a:solidFill>
               </a:rPr>
-              <a:t>$pack-1-1</a:t>
+              <a:t>$pack_1_1</a:t>
             </a:r>
           </a:p>
         </p:txBody>
@@ -4557,8 +4557,8 @@
         </p:nvSpPr>
         <p:spPr>
           <a:xfrm>
-            <a:off x="7103276" y="3138850"/>
-            <a:ext cx="511486" cy="369332"/>
+            <a:off x="7103275" y="3138850"/>
+            <a:ext cx="537557" cy="369332"/>
           </a:xfrm>
           <a:prstGeom prst="rect">
             <a:avLst/>
@@ -4578,7 +4578,7 @@
                   <a:srgbClr val="00B0F0"/>
                 </a:solidFill>
               </a:rPr>
-              <a:t>$pack-1-3</a:t>
+              <a:t>$pack_1_3</a:t>
             </a:r>
           </a:p>
         </p:txBody>
@@ -4621,7 +4621,7 @@
                   <a:srgbClr val="00B050"/>
                 </a:solidFill>
               </a:rPr>
-              <a:t>$wh-1   $wh-2   $wh-3</a:t>
+              <a:t>$wh_1   $wh_2   $wh_3</a:t>
             </a:r>
           </a:p>
         </p:txBody>
@@ -4856,8 +4856,8 @@
         </p:nvSpPr>
         <p:spPr>
           <a:xfrm>
-            <a:off x="6562572" y="759994"/>
-            <a:ext cx="511486" cy="369332"/>
+            <a:off x="6536501" y="759994"/>
+            <a:ext cx="537557" cy="369332"/>
           </a:xfrm>
           <a:prstGeom prst="rect">
             <a:avLst/>
@@ -4877,7 +4877,7 @@
                   <a:srgbClr val="00B0F0"/>
                 </a:solidFill>
               </a:rPr>
-              <a:t>$pack-2-1</a:t>
+              <a:t>$pack_2_1</a:t>
             </a:r>
           </a:p>
         </p:txBody>
@@ -4896,8 +4896,8 @@
         </p:nvSpPr>
         <p:spPr>
           <a:xfrm>
-            <a:off x="7100129" y="759994"/>
-            <a:ext cx="511486" cy="369332"/>
+            <a:off x="7074058" y="759994"/>
+            <a:ext cx="537557" cy="369332"/>
           </a:xfrm>
           <a:prstGeom prst="rect">
             <a:avLst/>
@@ -4917,7 +4917,7 @@
                   <a:srgbClr val="00B0F0"/>
                 </a:solidFill>
               </a:rPr>
-              <a:t>$pack-2-3</a:t>
+              <a:t>$pack_2_3</a:t>
             </a:r>
           </a:p>
         </p:txBody>

</xml_diff>